<commit_message>
By pravin & pratibha
</commit_message>
<xml_diff>
--- a/Digital Table service.pptx
+++ b/Digital Table service.pptx
@@ -15,6 +15,7 @@
     <p:sldId id="263" r:id="rId9"/>
     <p:sldId id="264" r:id="rId10"/>
     <p:sldId id="265" r:id="rId11"/>
+    <p:sldId id="266" r:id="rId12"/>
   </p:sldIdLst>
   <p:sldSz cx="9144000" cy="6858000" type="screen4x3"/>
   <p:notesSz cx="6858000" cy="9144000"/>
@@ -251,7 +252,7 @@
             <a:fld id="{1D8BD707-D9CF-40AE-B4C6-C98DA3205C09}" type="datetimeFigureOut">
               <a:rPr lang="en-US" smtClean="0"/>
               <a:pPr/>
-              <a:t>6/26/2019</a:t>
+              <a:t>6/27/2019</a:t>
             </a:fld>
             <a:endParaRPr lang="en-US"/>
           </a:p>
@@ -573,7 +574,7 @@
             <a:fld id="{1D8BD707-D9CF-40AE-B4C6-C98DA3205C09}" type="datetimeFigureOut">
               <a:rPr lang="en-US" smtClean="0"/>
               <a:pPr/>
-              <a:t>6/26/2019</a:t>
+              <a:t>6/27/2019</a:t>
             </a:fld>
             <a:endParaRPr lang="en-US"/>
           </a:p>
@@ -767,7 +768,7 @@
             <a:fld id="{1D8BD707-D9CF-40AE-B4C6-C98DA3205C09}" type="datetimeFigureOut">
               <a:rPr lang="en-US" smtClean="0"/>
               <a:pPr/>
-              <a:t>6/26/2019</a:t>
+              <a:t>6/27/2019</a:t>
             </a:fld>
             <a:endParaRPr lang="en-US"/>
           </a:p>
@@ -951,7 +952,7 @@
             <a:fld id="{1D8BD707-D9CF-40AE-B4C6-C98DA3205C09}" type="datetimeFigureOut">
               <a:rPr lang="en-US" smtClean="0"/>
               <a:pPr/>
-              <a:t>6/26/2019</a:t>
+              <a:t>6/27/2019</a:t>
             </a:fld>
             <a:endParaRPr lang="en-US"/>
           </a:p>
@@ -1228,7 +1229,7 @@
             <a:fld id="{1D8BD707-D9CF-40AE-B4C6-C98DA3205C09}" type="datetimeFigureOut">
               <a:rPr lang="en-US" smtClean="0"/>
               <a:pPr/>
-              <a:t>6/26/2019</a:t>
+              <a:t>6/27/2019</a:t>
             </a:fld>
             <a:endParaRPr lang="en-US"/>
           </a:p>
@@ -1705,7 +1706,7 @@
             <a:fld id="{1D8BD707-D9CF-40AE-B4C6-C98DA3205C09}" type="datetimeFigureOut">
               <a:rPr lang="en-US" smtClean="0"/>
               <a:pPr/>
-              <a:t>6/26/2019</a:t>
+              <a:t>6/27/2019</a:t>
             </a:fld>
             <a:endParaRPr lang="en-US"/>
           </a:p>
@@ -2203,7 +2204,7 @@
             <a:fld id="{1D8BD707-D9CF-40AE-B4C6-C98DA3205C09}" type="datetimeFigureOut">
               <a:rPr lang="en-US" smtClean="0"/>
               <a:pPr/>
-              <a:t>6/26/2019</a:t>
+              <a:t>6/27/2019</a:t>
             </a:fld>
             <a:endParaRPr lang="en-US"/>
           </a:p>
@@ -2338,7 +2339,7 @@
             <a:fld id="{1D8BD707-D9CF-40AE-B4C6-C98DA3205C09}" type="datetimeFigureOut">
               <a:rPr lang="en-US" smtClean="0"/>
               <a:pPr/>
-              <a:t>6/26/2019</a:t>
+              <a:t>6/27/2019</a:t>
             </a:fld>
             <a:endParaRPr lang="en-US"/>
           </a:p>
@@ -2491,7 +2492,7 @@
             <a:fld id="{1D8BD707-D9CF-40AE-B4C6-C98DA3205C09}" type="datetimeFigureOut">
               <a:rPr lang="en-US" smtClean="0"/>
               <a:pPr/>
-              <a:t>6/26/2019</a:t>
+              <a:t>6/27/2019</a:t>
             </a:fld>
             <a:endParaRPr lang="en-US"/>
           </a:p>
@@ -2822,7 +2823,7 @@
             <a:fld id="{1D8BD707-D9CF-40AE-B4C6-C98DA3205C09}" type="datetimeFigureOut">
               <a:rPr lang="en-US" smtClean="0"/>
               <a:pPr/>
-              <a:t>6/26/2019</a:t>
+              <a:t>6/27/2019</a:t>
             </a:fld>
             <a:endParaRPr lang="en-US"/>
           </a:p>
@@ -2965,7 +2966,7 @@
             <a:fld id="{1D8BD707-D9CF-40AE-B4C6-C98DA3205C09}" type="datetimeFigureOut">
               <a:rPr lang="en-US" smtClean="0"/>
               <a:pPr/>
-              <a:t>6/26/2019</a:t>
+              <a:t>6/27/2019</a:t>
             </a:fld>
             <a:endParaRPr lang="en-US"/>
           </a:p>
@@ -3755,7 +3756,7 @@
             <a:fld id="{1D8BD707-D9CF-40AE-B4C6-C98DA3205C09}" type="datetimeFigureOut">
               <a:rPr lang="en-US" smtClean="0"/>
               <a:pPr/>
-              <a:t>6/26/2019</a:t>
+              <a:t>6/27/2019</a:t>
             </a:fld>
             <a:endParaRPr lang="en-US"/>
           </a:p>
@@ -4310,6 +4311,110 @@
           <a:bodyPr/>
           <a:lstStyle/>
           <a:p>
+            <a:pPr algn="ctr"/>
+            <a:r>
+              <a:rPr lang="en-IN" dirty="0" err="1" smtClean="0"/>
+              <a:t>Mayuri</a:t>
+            </a:r>
+            <a:r>
+              <a:rPr lang="en-IN" dirty="0" smtClean="0"/>
+              <a:t> </a:t>
+            </a:r>
+          </a:p>
+          <a:p>
+            <a:pPr algn="ctr"/>
+            <a:r>
+              <a:rPr lang="en-IN" dirty="0" err="1" smtClean="0"/>
+              <a:t>Pooja</a:t>
+            </a:r>
+            <a:r>
+              <a:rPr lang="en-IN" dirty="0" smtClean="0"/>
+              <a:t> </a:t>
+            </a:r>
+            <a:r>
+              <a:rPr lang="en-IN" dirty="0" err="1" smtClean="0"/>
+              <a:t>shimpi</a:t>
+            </a:r>
+            <a:endParaRPr lang="en-IN" dirty="0" smtClean="0"/>
+          </a:p>
+          <a:p>
+            <a:pPr algn="ctr"/>
+            <a:r>
+              <a:rPr lang="en-IN" dirty="0" err="1" smtClean="0"/>
+              <a:t>Pratibha</a:t>
+            </a:r>
+            <a:r>
+              <a:rPr lang="en-IN" dirty="0" smtClean="0"/>
+              <a:t> </a:t>
+            </a:r>
+            <a:r>
+              <a:rPr lang="en-IN" dirty="0" err="1" smtClean="0"/>
+              <a:t>karande</a:t>
+            </a:r>
+            <a:endParaRPr lang="en-IN" dirty="0" smtClean="0"/>
+          </a:p>
+          <a:p>
+            <a:pPr algn="ctr"/>
+            <a:r>
+              <a:rPr lang="en-IN" dirty="0" err="1" smtClean="0"/>
+              <a:t>Pravin</a:t>
+            </a:r>
+            <a:r>
+              <a:rPr lang="en-IN" dirty="0" smtClean="0"/>
+              <a:t> </a:t>
+            </a:r>
+            <a:r>
+              <a:rPr lang="en-IN" dirty="0" err="1" smtClean="0"/>
+              <a:t>panchal</a:t>
+            </a:r>
+            <a:endParaRPr lang="en-IN" dirty="0" smtClean="0"/>
+          </a:p>
+          <a:p>
+            <a:pPr algn="ctr"/>
+            <a:r>
+              <a:rPr lang="en-IN" dirty="0" err="1" smtClean="0"/>
+              <a:t>Pappu</a:t>
+            </a:r>
+            <a:r>
+              <a:rPr lang="en-IN" dirty="0" smtClean="0"/>
+              <a:t> </a:t>
+            </a:r>
+            <a:r>
+              <a:rPr lang="en-IN" dirty="0" err="1" smtClean="0"/>
+              <a:t>kabgate</a:t>
+            </a:r>
+            <a:endParaRPr lang="en-IN" dirty="0" smtClean="0"/>
+          </a:p>
+          <a:p>
+            <a:pPr algn="ctr"/>
+            <a:r>
+              <a:rPr lang="en-IN" dirty="0" err="1" smtClean="0"/>
+              <a:t>Dakshata</a:t>
+            </a:r>
+            <a:r>
+              <a:rPr lang="en-IN" dirty="0" smtClean="0"/>
+              <a:t> </a:t>
+            </a:r>
+            <a:r>
+              <a:rPr lang="en-IN" dirty="0" err="1" smtClean="0"/>
+              <a:t>mhatre</a:t>
+            </a:r>
+            <a:endParaRPr lang="en-IN" dirty="0" smtClean="0"/>
+          </a:p>
+          <a:p>
+            <a:pPr algn="ctr"/>
+            <a:r>
+              <a:rPr lang="en-IN" dirty="0" err="1" smtClean="0"/>
+              <a:t>Rutuja</a:t>
+            </a:r>
+            <a:r>
+              <a:rPr lang="en-IN" dirty="0" smtClean="0"/>
+              <a:t> </a:t>
+            </a:r>
+            <a:r>
+              <a:rPr lang="en-IN" dirty="0" err="1" smtClean="0"/>
+              <a:t>gaikwad</a:t>
+            </a:r>
             <a:endParaRPr lang="en-IN" dirty="0"/>
           </a:p>
         </p:txBody>
@@ -4435,6 +4540,74 @@
 </p:sld>
 </file>
 
+<file path=ppt/slides/slide11.xml><?xml version="1.0" encoding="utf-8"?>
+<p:sld xmlns:a="http://schemas.openxmlformats.org/drawingml/2006/main" xmlns:r="http://schemas.openxmlformats.org/officeDocument/2006/relationships" xmlns:p="http://schemas.openxmlformats.org/presentationml/2006/main">
+  <p:cSld>
+    <p:spTree>
+      <p:nvGrpSpPr>
+        <p:cNvPr id="1" name=""/>
+        <p:cNvGrpSpPr/>
+        <p:nvPr/>
+      </p:nvGrpSpPr>
+      <p:grpSpPr>
+        <a:xfrm>
+          <a:off x="0" y="0"/>
+          <a:ext cx="0" cy="0"/>
+          <a:chOff x="0" y="0"/>
+          <a:chExt cx="0" cy="0"/>
+        </a:xfrm>
+      </p:grpSpPr>
+      <p:sp>
+        <p:nvSpPr>
+          <p:cNvPr id="2" name="Title 1"/>
+          <p:cNvSpPr>
+            <a:spLocks noGrp="1"/>
+          </p:cNvSpPr>
+          <p:nvPr>
+            <p:ph type="title"/>
+          </p:nvPr>
+        </p:nvSpPr>
+        <p:spPr/>
+        <p:txBody>
+          <a:bodyPr/>
+          <a:lstStyle/>
+          <a:p>
+            <a:endParaRPr lang="en-IN"/>
+          </a:p>
+        </p:txBody>
+      </p:sp>
+      <p:sp>
+        <p:nvSpPr>
+          <p:cNvPr id="3" name="Content Placeholder 2"/>
+          <p:cNvSpPr>
+            <a:spLocks noGrp="1"/>
+          </p:cNvSpPr>
+          <p:nvPr>
+            <p:ph idx="1"/>
+          </p:nvPr>
+        </p:nvSpPr>
+        <p:spPr/>
+        <p:txBody>
+          <a:bodyPr/>
+          <a:lstStyle/>
+          <a:p>
+            <a:endParaRPr lang="en-IN"/>
+          </a:p>
+        </p:txBody>
+      </p:sp>
+    </p:spTree>
+    <p:extLst>
+      <p:ext uri="{BB962C8B-B14F-4D97-AF65-F5344CB8AC3E}">
+        <p14:creationId xmlns:p14="http://schemas.microsoft.com/office/powerpoint/2010/main" val="2444179888"/>
+      </p:ext>
+    </p:extLst>
+  </p:cSld>
+  <p:clrMapOvr>
+    <a:masterClrMapping/>
+  </p:clrMapOvr>
+</p:sld>
+</file>
+
 <file path=ppt/slides/slide2.xml><?xml version="1.0" encoding="utf-8"?>
 <p:sld xmlns:a="http://schemas.openxmlformats.org/drawingml/2006/main" xmlns:r="http://schemas.openxmlformats.org/officeDocument/2006/relationships" xmlns:p="http://schemas.openxmlformats.org/presentationml/2006/main">
   <p:cSld>
@@ -5247,18 +5420,12 @@
           <a:lstStyle/>
           <a:p>
             <a:r>
-              <a:rPr lang="en-US" dirty="0">
-                <a:effectLst/>
-              </a:rPr>
-              <a:t>Customers History</a:t>
-            </a:r>
-            <a:r>
               <a:rPr lang="en-US" b="1" dirty="0">
                 <a:effectLst/>
               </a:rPr>
-              <a:t> </a:t>
-            </a:r>
-            <a:endParaRPr lang="en-IN" dirty="0"/>
+              <a:t>Customers History </a:t>
+            </a:r>
+            <a:endParaRPr lang="en-IN" b="1" dirty="0"/>
           </a:p>
         </p:txBody>
       </p:sp>

</xml_diff>